<commit_message>
Update plot and presentazione
</commit_message>
<xml_diff>
--- a/Presentazione COMSOL - 2.pptx
+++ b/Presentazione COMSOL - 2.pptx
@@ -271,7 +271,7 @@
           <a:p>
             <a:fld id="{3654AF55-DA74-4F8E-B7CA-625C9D81A063}" type="datetimeFigureOut">
               <a:rPr lang="it-IT" smtClean="0"/>
-              <a:t>29/05/2020</a:t>
+              <a:t>01/06/2020</a:t>
             </a:fld>
             <a:endParaRPr lang="it-IT"/>
           </a:p>
@@ -469,7 +469,7 @@
           <a:p>
             <a:fld id="{3654AF55-DA74-4F8E-B7CA-625C9D81A063}" type="datetimeFigureOut">
               <a:rPr lang="it-IT" smtClean="0"/>
-              <a:t>29/05/2020</a:t>
+              <a:t>01/06/2020</a:t>
             </a:fld>
             <a:endParaRPr lang="it-IT"/>
           </a:p>
@@ -677,7 +677,7 @@
           <a:p>
             <a:fld id="{3654AF55-DA74-4F8E-B7CA-625C9D81A063}" type="datetimeFigureOut">
               <a:rPr lang="it-IT" smtClean="0"/>
-              <a:t>29/05/2020</a:t>
+              <a:t>01/06/2020</a:t>
             </a:fld>
             <a:endParaRPr lang="it-IT"/>
           </a:p>
@@ -875,7 +875,7 @@
           <a:p>
             <a:fld id="{3654AF55-DA74-4F8E-B7CA-625C9D81A063}" type="datetimeFigureOut">
               <a:rPr lang="it-IT" smtClean="0"/>
-              <a:t>29/05/2020</a:t>
+              <a:t>01/06/2020</a:t>
             </a:fld>
             <a:endParaRPr lang="it-IT"/>
           </a:p>
@@ -1150,7 +1150,7 @@
           <a:p>
             <a:fld id="{3654AF55-DA74-4F8E-B7CA-625C9D81A063}" type="datetimeFigureOut">
               <a:rPr lang="it-IT" smtClean="0"/>
-              <a:t>29/05/2020</a:t>
+              <a:t>01/06/2020</a:t>
             </a:fld>
             <a:endParaRPr lang="it-IT"/>
           </a:p>
@@ -1415,7 +1415,7 @@
           <a:p>
             <a:fld id="{3654AF55-DA74-4F8E-B7CA-625C9D81A063}" type="datetimeFigureOut">
               <a:rPr lang="it-IT" smtClean="0"/>
-              <a:t>29/05/2020</a:t>
+              <a:t>01/06/2020</a:t>
             </a:fld>
             <a:endParaRPr lang="it-IT"/>
           </a:p>
@@ -1827,7 +1827,7 @@
           <a:p>
             <a:fld id="{3654AF55-DA74-4F8E-B7CA-625C9D81A063}" type="datetimeFigureOut">
               <a:rPr lang="it-IT" smtClean="0"/>
-              <a:t>29/05/2020</a:t>
+              <a:t>01/06/2020</a:t>
             </a:fld>
             <a:endParaRPr lang="it-IT"/>
           </a:p>
@@ -1968,7 +1968,7 @@
           <a:p>
             <a:fld id="{3654AF55-DA74-4F8E-B7CA-625C9D81A063}" type="datetimeFigureOut">
               <a:rPr lang="it-IT" smtClean="0"/>
-              <a:t>29/05/2020</a:t>
+              <a:t>01/06/2020</a:t>
             </a:fld>
             <a:endParaRPr lang="it-IT"/>
           </a:p>
@@ -2081,7 +2081,7 @@
           <a:p>
             <a:fld id="{3654AF55-DA74-4F8E-B7CA-625C9D81A063}" type="datetimeFigureOut">
               <a:rPr lang="it-IT" smtClean="0"/>
-              <a:t>29/05/2020</a:t>
+              <a:t>01/06/2020</a:t>
             </a:fld>
             <a:endParaRPr lang="it-IT"/>
           </a:p>
@@ -2392,7 +2392,7 @@
           <a:p>
             <a:fld id="{3654AF55-DA74-4F8E-B7CA-625C9D81A063}" type="datetimeFigureOut">
               <a:rPr lang="it-IT" smtClean="0"/>
-              <a:t>29/05/2020</a:t>
+              <a:t>01/06/2020</a:t>
             </a:fld>
             <a:endParaRPr lang="it-IT"/>
           </a:p>
@@ -2680,7 +2680,7 @@
           <a:p>
             <a:fld id="{3654AF55-DA74-4F8E-B7CA-625C9D81A063}" type="datetimeFigureOut">
               <a:rPr lang="it-IT" smtClean="0"/>
-              <a:t>29/05/2020</a:t>
+              <a:t>01/06/2020</a:t>
             </a:fld>
             <a:endParaRPr lang="it-IT"/>
           </a:p>
@@ -2921,7 +2921,7 @@
           <a:p>
             <a:fld id="{3654AF55-DA74-4F8E-B7CA-625C9D81A063}" type="datetimeFigureOut">
               <a:rPr lang="it-IT" smtClean="0"/>
-              <a:t>29/05/2020</a:t>
+              <a:t>01/06/2020</a:t>
             </a:fld>
             <a:endParaRPr lang="it-IT"/>
           </a:p>
@@ -4319,10 +4319,10 @@
       </mc:AlternateContent>
       <p:pic>
         <p:nvPicPr>
-          <p:cNvPr id="5" name="Immagine 4" descr="Immagine che contiene testo, mappa&#10;&#10;Descrizione generata automaticamente">
+          <p:cNvPr id="6" name="Immagine 5" descr="Immagine che contiene testo, mappa&#10;&#10;Descrizione generata automaticamente">
             <a:extLst>
               <a:ext uri="{FF2B5EF4-FFF2-40B4-BE49-F238E27FC236}">
-                <a16:creationId xmlns:a16="http://schemas.microsoft.com/office/drawing/2014/main" id="{559A16D7-1FF0-49A9-B2BC-D37A5A20FDBE}"/>
+                <a16:creationId xmlns:a16="http://schemas.microsoft.com/office/drawing/2014/main" id="{12E4B805-A4A7-42CA-A1D7-9F39ECD891BE}"/>
               </a:ext>
             </a:extLst>
           </p:cNvPr>
@@ -4345,8 +4345,8 @@
         </p:blipFill>
         <p:spPr>
           <a:xfrm>
-            <a:off x="2394821" y="1308347"/>
-            <a:ext cx="7402358" cy="5549653"/>
+            <a:off x="2322987" y="1200638"/>
+            <a:ext cx="7546025" cy="5657362"/>
           </a:xfrm>
           <a:prstGeom prst="rect">
             <a:avLst/>
@@ -4567,10 +4567,10 @@
       </mc:AlternateContent>
       <p:pic>
         <p:nvPicPr>
-          <p:cNvPr id="5" name="Immagine 4" descr="Immagine che contiene testo, mappa&#10;&#10;Descrizione generata automaticamente">
+          <p:cNvPr id="3" name="Immagine 2" descr="Immagine che contiene testo, mappa&#10;&#10;Descrizione generata automaticamente">
             <a:extLst>
               <a:ext uri="{FF2B5EF4-FFF2-40B4-BE49-F238E27FC236}">
-                <a16:creationId xmlns:a16="http://schemas.microsoft.com/office/drawing/2014/main" id="{CF80FD84-7D34-4142-8BD3-7F1A3F6B4111}"/>
+                <a16:creationId xmlns:a16="http://schemas.microsoft.com/office/drawing/2014/main" id="{82F34B8C-90E5-45AE-803F-DA8DEC4B3CD1}"/>
               </a:ext>
             </a:extLst>
           </p:cNvPr>
@@ -4593,8 +4593,8 @@
         </p:blipFill>
         <p:spPr>
           <a:xfrm>
-            <a:off x="2081213" y="838114"/>
-            <a:ext cx="8029574" cy="6019886"/>
+            <a:off x="2100693" y="867323"/>
+            <a:ext cx="7990614" cy="5990677"/>
           </a:xfrm>
           <a:prstGeom prst="rect">
             <a:avLst/>
@@ -4631,8 +4631,8 @@
           <a:chExt cx="0" cy="0"/>
         </a:xfrm>
       </p:grpSpPr>
-      <mc:AlternateContent xmlns:mc="http://schemas.openxmlformats.org/markup-compatibility/2006" xmlns:a14="http://schemas.microsoft.com/office/drawing/2010/main">
-        <mc:Choice Requires="a14">
+      <mc:AlternateContent xmlns:mc="http://schemas.openxmlformats.org/markup-compatibility/2006">
+        <mc:Choice xmlns:a14="http://schemas.microsoft.com/office/drawing/2010/main" Requires="a14">
           <p:graphicFrame>
             <p:nvGraphicFramePr>
               <p:cNvPr id="2" name="Tabella 2">
@@ -4648,14 +4648,14 @@
               <p:nvPr>
                 <p:extLst>
                   <p:ext uri="{D42A27DB-BD31-4B8C-83A1-F6EECF244321}">
-                    <p14:modId xmlns:p14="http://schemas.microsoft.com/office/powerpoint/2010/main" val="1183912011"/>
+                    <p14:modId xmlns:p14="http://schemas.microsoft.com/office/powerpoint/2010/main" val="771796899"/>
                   </p:ext>
                 </p:extLst>
               </p:nvPr>
             </p:nvGraphicFramePr>
             <p:xfrm>
-              <a:off x="328769" y="669396"/>
-              <a:ext cx="5664200" cy="4971550"/>
+              <a:off x="431798" y="1815882"/>
+              <a:ext cx="5664200" cy="4955121"/>
             </p:xfrm>
             <a:graphic>
               <a:graphicData uri="http://schemas.openxmlformats.org/drawingml/2006/table">
@@ -4679,7 +4679,7 @@
                       </a:extLst>
                     </a:gridCol>
                   </a:tblGrid>
-                  <a:tr h="0">
+                  <a:tr h="350580">
                     <a:tc>
                       <a:txBody>
                         <a:bodyPr/>
@@ -4713,7 +4713,7 @@
                       </a:ext>
                     </a:extLst>
                   </a:tr>
-                  <a:tr h="345907">
+                  <a:tr h="350580">
                     <a:tc>
                       <a:txBody>
                         <a:bodyPr/>
@@ -4827,7 +4827,7 @@
                       </a:ext>
                     </a:extLst>
                   </a:tr>
-                  <a:tr h="345907">
+                  <a:tr h="350580">
                     <a:tc>
                       <a:txBody>
                         <a:bodyPr/>
@@ -4930,7 +4930,7 @@
                       </a:ext>
                     </a:extLst>
                   </a:tr>
-                  <a:tr h="345907">
+                  <a:tr h="350580">
                     <a:tc>
                       <a:txBody>
                         <a:bodyPr/>
@@ -4992,7 +4992,7 @@
                       </a:ext>
                     </a:extLst>
                   </a:tr>
-                  <a:tr h="345907">
+                  <a:tr h="350580">
                     <a:tc>
                       <a:txBody>
                         <a:bodyPr/>
@@ -5071,7 +5071,7 @@
                       </a:ext>
                     </a:extLst>
                   </a:tr>
-                  <a:tr h="345907">
+                  <a:tr h="350580">
                     <a:tc>
                       <a:txBody>
                         <a:bodyPr/>
@@ -5151,7 +5151,7 @@
                       </a:ext>
                     </a:extLst>
                   </a:tr>
-                  <a:tr h="340556">
+                  <a:tr h="350580">
                     <a:tc>
                       <a:txBody>
                         <a:bodyPr/>
@@ -5230,7 +5230,7 @@
                       </a:ext>
                     </a:extLst>
                   </a:tr>
-                  <a:tr h="345907">
+                  <a:tr h="350580">
                     <a:tc>
                       <a:txBody>
                         <a:bodyPr/>
@@ -5309,7 +5309,7 @@
                       </a:ext>
                     </a:extLst>
                   </a:tr>
-                  <a:tr h="607080">
+                  <a:tr h="615281">
                     <a:tc>
                       <a:txBody>
                         <a:bodyPr/>
@@ -5434,7 +5434,7 @@
                       </a:ext>
                     </a:extLst>
                   </a:tr>
-                  <a:tr h="607080">
+                  <a:tr h="615281">
                     <a:tc>
                       <a:txBody>
                         <a:bodyPr/>
@@ -5559,7 +5559,7 @@
                       </a:ext>
                     </a:extLst>
                   </a:tr>
-                  <a:tr h="362381">
+                  <a:tr h="350580">
                     <a:tc>
                       <a:txBody>
                         <a:bodyPr/>
@@ -5640,7 +5640,7 @@
                       </a:ext>
                     </a:extLst>
                   </a:tr>
-                  <a:tr h="395866">
+                  <a:tr h="379437">
                     <a:tc>
                       <a:txBody>
                         <a:bodyPr/>
@@ -5726,7 +5726,7 @@
             </a:graphic>
           </p:graphicFrame>
         </mc:Choice>
-        <mc:Fallback xmlns="">
+        <mc:Fallback>
           <p:graphicFrame>
             <p:nvGraphicFramePr>
               <p:cNvPr id="2" name="Tabella 2">
@@ -5742,14 +5742,14 @@
               <p:nvPr>
                 <p:extLst>
                   <p:ext uri="{D42A27DB-BD31-4B8C-83A1-F6EECF244321}">
-                    <p14:modId xmlns:p14="http://schemas.microsoft.com/office/powerpoint/2010/main" val="1183912011"/>
+                    <p14:modId xmlns:p14="http://schemas.microsoft.com/office/powerpoint/2010/main" val="771796899"/>
                   </p:ext>
                 </p:extLst>
               </p:nvPr>
             </p:nvGraphicFramePr>
             <p:xfrm>
-              <a:off x="328769" y="669396"/>
-              <a:ext cx="5664200" cy="4971550"/>
+              <a:off x="431798" y="1815882"/>
+              <a:ext cx="5664200" cy="4955121"/>
             </p:xfrm>
             <a:graphic>
               <a:graphicData uri="http://schemas.openxmlformats.org/drawingml/2006/table">
@@ -6464,7 +6464,7 @@
                         <a:blipFill>
                           <a:blip r:embed="rId2"/>
                           <a:stretch>
-                            <a:fillRect l="-100430" t="-462857" r="-860" b="-229524"/>
+                            <a:fillRect l="-100215" t="-462857" r="-1075" b="-229524"/>
                           </a:stretch>
                         </a:blipFill>
                       </a:tcPr>
@@ -6536,7 +6536,7 @@
                         <a:blipFill>
                           <a:blip r:embed="rId2"/>
                           <a:stretch>
-                            <a:fillRect l="-100430" t="-557547" r="-860" b="-127358"/>
+                            <a:fillRect l="-100215" t="-557547" r="-1075" b="-127358"/>
                           </a:stretch>
                         </a:blipFill>
                       </a:tcPr>
@@ -6609,7 +6609,6 @@
                         <a:bodyPr/>
                         <a:lstStyle/>
                         <a:p>
-                          <a:pPr/>
                           <a:r>
                             <a:rPr lang="it-IT" dirty="0"/>
                             <a:t>Ideal </a:t>
@@ -6629,7 +6628,7 @@
                       </a:ext>
                     </a:extLst>
                   </a:tr>
-                  <a:tr h="395866">
+                  <a:tr h="379437">
                     <a:tc>
                       <a:txBody>
                         <a:bodyPr/>
@@ -6691,7 +6690,6 @@
                         <a:bodyPr/>
                         <a:lstStyle/>
                         <a:p>
-                          <a:pPr/>
                           <a:r>
                             <a:rPr lang="it-IT" dirty="0"/>
                             <a:t>Ideal </a:t>
@@ -6717,8 +6715,8 @@
           </p:graphicFrame>
         </mc:Fallback>
       </mc:AlternateContent>
-      <mc:AlternateContent xmlns:mc="http://schemas.openxmlformats.org/markup-compatibility/2006" xmlns:a14="http://schemas.microsoft.com/office/drawing/2010/main">
-        <mc:Choice Requires="a14">
+      <mc:AlternateContent xmlns:mc="http://schemas.openxmlformats.org/markup-compatibility/2006">
+        <mc:Choice xmlns:a14="http://schemas.microsoft.com/office/drawing/2010/main" Requires="a14">
           <p:graphicFrame>
             <p:nvGraphicFramePr>
               <p:cNvPr id="4" name="Tabella 2">
@@ -6734,13 +6732,13 @@
               <p:nvPr>
                 <p:extLst>
                   <p:ext uri="{D42A27DB-BD31-4B8C-83A1-F6EECF244321}">
-                    <p14:modId xmlns:p14="http://schemas.microsoft.com/office/powerpoint/2010/main" val="3815450332"/>
+                    <p14:modId xmlns:p14="http://schemas.microsoft.com/office/powerpoint/2010/main" val="2145387242"/>
                   </p:ext>
                 </p:extLst>
               </p:nvPr>
             </p:nvGraphicFramePr>
             <p:xfrm>
-              <a:off x="6311184" y="669396"/>
+              <a:off x="6311898" y="1815882"/>
               <a:ext cx="5664200" cy="4389120"/>
             </p:xfrm>
             <a:graphic>
@@ -7557,7 +7555,7 @@
             </a:graphic>
           </p:graphicFrame>
         </mc:Choice>
-        <mc:Fallback xmlns="">
+        <mc:Fallback>
           <p:graphicFrame>
             <p:nvGraphicFramePr>
               <p:cNvPr id="4" name="Tabella 2">
@@ -7573,13 +7571,13 @@
               <p:nvPr>
                 <p:extLst>
                   <p:ext uri="{D42A27DB-BD31-4B8C-83A1-F6EECF244321}">
-                    <p14:modId xmlns:p14="http://schemas.microsoft.com/office/powerpoint/2010/main" val="3815450332"/>
+                    <p14:modId xmlns:p14="http://schemas.microsoft.com/office/powerpoint/2010/main" val="2145387242"/>
                   </p:ext>
                 </p:extLst>
               </p:nvPr>
             </p:nvGraphicFramePr>
             <p:xfrm>
-              <a:off x="6311184" y="669396"/>
+              <a:off x="6311898" y="1815882"/>
               <a:ext cx="5664200" cy="4389120"/>
             </p:xfrm>
             <a:graphic>
@@ -8226,6 +8224,127 @@
           </p:graphicFrame>
         </mc:Fallback>
       </mc:AlternateContent>
+      <p:sp>
+        <p:nvSpPr>
+          <p:cNvPr id="3" name="CasellaDiTesto 2">
+            <a:extLst>
+              <a:ext uri="{FF2B5EF4-FFF2-40B4-BE49-F238E27FC236}">
+                <a16:creationId xmlns:a16="http://schemas.microsoft.com/office/drawing/2014/main" id="{5C0C35E3-FCDC-409B-B037-48B1D5B2146D}"/>
+              </a:ext>
+            </a:extLst>
+          </p:cNvPr>
+          <p:cNvSpPr txBox="1"/>
+          <p:nvPr/>
+        </p:nvSpPr>
+        <p:spPr>
+          <a:xfrm>
+            <a:off x="-1" y="0"/>
+            <a:ext cx="12191999" cy="1815882"/>
+          </a:xfrm>
+          <a:prstGeom prst="rect">
+            <a:avLst/>
+          </a:prstGeom>
+          <a:noFill/>
+        </p:spPr>
+        <p:txBody>
+          <a:bodyPr wrap="square" rtlCol="0">
+            <a:spAutoFit/>
+          </a:bodyPr>
+          <a:lstStyle/>
+          <a:p>
+            <a:pPr algn="ctr"/>
+            <a:r>
+              <a:rPr lang="it-IT" sz="2800" dirty="0"/>
+              <a:t>Source: Sarah L. </a:t>
+            </a:r>
+            <a:r>
+              <a:rPr lang="it-IT" sz="2800" dirty="0" err="1"/>
+              <a:t>Howell</a:t>
+            </a:r>
+            <a:r>
+              <a:rPr lang="it-IT" sz="2800" dirty="0"/>
+              <a:t>, Deep </a:t>
+            </a:r>
+            <a:r>
+              <a:rPr lang="it-IT" sz="2800" dirty="0" err="1"/>
+              <a:t>Jariwala</a:t>
+            </a:r>
+            <a:r>
+              <a:rPr lang="it-IT" sz="2800" dirty="0"/>
+              <a:t>, Chung-Chiang </a:t>
+            </a:r>
+            <a:r>
+              <a:rPr lang="it-IT" sz="2800" dirty="0" err="1"/>
+              <a:t>Wu</a:t>
+            </a:r>
+            <a:r>
+              <a:rPr lang="it-IT" sz="2800" dirty="0"/>
+              <a:t>, </a:t>
+            </a:r>
+            <a:r>
+              <a:rPr lang="it-IT" sz="2800" dirty="0" err="1"/>
+              <a:t>Kan-Sheng</a:t>
+            </a:r>
+            <a:r>
+              <a:rPr lang="it-IT" sz="2800" dirty="0"/>
+              <a:t> Chen, </a:t>
+            </a:r>
+            <a:r>
+              <a:rPr lang="it-IT" sz="2800" dirty="0" err="1"/>
+              <a:t>Vinod</a:t>
+            </a:r>
+            <a:r>
+              <a:rPr lang="it-IT" sz="2800" dirty="0"/>
+              <a:t> K. </a:t>
+            </a:r>
+            <a:r>
+              <a:rPr lang="it-IT" sz="2800" dirty="0" err="1"/>
+              <a:t>Sangwan</a:t>
+            </a:r>
+            <a:r>
+              <a:rPr lang="it-IT" sz="2800" dirty="0"/>
+              <a:t>, </a:t>
+            </a:r>
+            <a:r>
+              <a:rPr lang="it-IT" sz="2800" dirty="0" err="1"/>
+              <a:t>Junmo</a:t>
+            </a:r>
+            <a:r>
+              <a:rPr lang="it-IT" sz="2800" dirty="0"/>
+              <a:t> Kang, Tobin J. </a:t>
+            </a:r>
+            <a:r>
+              <a:rPr lang="it-IT" sz="2800" dirty="0" err="1"/>
+              <a:t>Marks</a:t>
+            </a:r>
+            <a:r>
+              <a:rPr lang="it-IT" sz="2800" dirty="0"/>
+              <a:t>, Mark C. </a:t>
+            </a:r>
+            <a:r>
+              <a:rPr lang="it-IT" sz="2800" dirty="0" err="1"/>
+              <a:t>Hersam</a:t>
+            </a:r>
+            <a:r>
+              <a:rPr lang="it-IT" sz="2800" dirty="0"/>
+              <a:t> and Lincoln J. </a:t>
+            </a:r>
+            <a:r>
+              <a:rPr lang="it-IT" sz="2800" dirty="0" err="1"/>
+              <a:t>Lauhon</a:t>
+            </a:r>
+            <a:r>
+              <a:rPr lang="it-IT" sz="2800" dirty="0"/>
+              <a:t>, </a:t>
+            </a:r>
+            <a:r>
+              <a:rPr lang="en-US" sz="2800" b="1" dirty="0"/>
+              <a:t>“Investigation of Band-Offsets at Monolayer-Multilayer MoS2 Junctions by Scanning Photocurrent”</a:t>
+            </a:r>
+            <a:endParaRPr lang="it-IT" sz="2800" dirty="0"/>
+          </a:p>
+        </p:txBody>
+      </p:sp>
     </p:spTree>
     <p:extLst>
       <p:ext uri="{BB962C8B-B14F-4D97-AF65-F5344CB8AC3E}">
@@ -9302,8 +9421,8 @@
           <a:chExt cx="0" cy="0"/>
         </a:xfrm>
       </p:grpSpPr>
-      <mc:AlternateContent xmlns:mc="http://schemas.openxmlformats.org/markup-compatibility/2006" xmlns:a14="http://schemas.microsoft.com/office/drawing/2010/main">
-        <mc:Choice Requires="a14">
+      <mc:AlternateContent xmlns:mc="http://schemas.openxmlformats.org/markup-compatibility/2006">
+        <mc:Choice xmlns:a14="http://schemas.microsoft.com/office/drawing/2010/main" Requires="a14">
           <p:graphicFrame>
             <p:nvGraphicFramePr>
               <p:cNvPr id="2" name="Tabella 2">
@@ -9319,13 +9438,13 @@
               <p:nvPr>
                 <p:extLst>
                   <p:ext uri="{D42A27DB-BD31-4B8C-83A1-F6EECF244321}">
-                    <p14:modId xmlns:p14="http://schemas.microsoft.com/office/powerpoint/2010/main" val="490115528"/>
+                    <p14:modId xmlns:p14="http://schemas.microsoft.com/office/powerpoint/2010/main" val="3420919154"/>
                   </p:ext>
                 </p:extLst>
               </p:nvPr>
             </p:nvGraphicFramePr>
             <p:xfrm>
-              <a:off x="292458" y="822039"/>
+              <a:off x="292458" y="1440225"/>
               <a:ext cx="5664200" cy="5213922"/>
             </p:xfrm>
             <a:graphic>
@@ -10285,7 +10404,7 @@
             </a:graphic>
           </p:graphicFrame>
         </mc:Choice>
-        <mc:Fallback xmlns="">
+        <mc:Fallback>
           <p:graphicFrame>
             <p:nvGraphicFramePr>
               <p:cNvPr id="2" name="Tabella 2">
@@ -10301,13 +10420,13 @@
               <p:nvPr>
                 <p:extLst>
                   <p:ext uri="{D42A27DB-BD31-4B8C-83A1-F6EECF244321}">
-                    <p14:modId xmlns:p14="http://schemas.microsoft.com/office/powerpoint/2010/main" val="490115528"/>
+                    <p14:modId xmlns:p14="http://schemas.microsoft.com/office/powerpoint/2010/main" val="3420919154"/>
                   </p:ext>
                 </p:extLst>
               </p:nvPr>
             </p:nvGraphicFramePr>
             <p:xfrm>
-              <a:off x="292458" y="822039"/>
+              <a:off x="292458" y="1440225"/>
               <a:ext cx="5664200" cy="5213922"/>
             </p:xfrm>
             <a:graphic>
@@ -10859,7 +10978,7 @@
                         <a:blipFill>
                           <a:blip r:embed="rId2"/>
                           <a:stretch>
-                            <a:fillRect l="-100430" t="-348571" r="-860" b="-386667"/>
+                            <a:fillRect l="-100430" t="-344340" r="-860" b="-383019"/>
                           </a:stretch>
                         </a:blipFill>
                       </a:tcPr>
@@ -11215,8 +11334,8 @@
           </p:graphicFrame>
         </mc:Fallback>
       </mc:AlternateContent>
-      <mc:AlternateContent xmlns:mc="http://schemas.openxmlformats.org/markup-compatibility/2006" xmlns:a14="http://schemas.microsoft.com/office/drawing/2010/main">
-        <mc:Choice Requires="a14">
+      <mc:AlternateContent xmlns:mc="http://schemas.openxmlformats.org/markup-compatibility/2006">
+        <mc:Choice xmlns:a14="http://schemas.microsoft.com/office/drawing/2010/main" Requires="a14">
           <p:graphicFrame>
             <p:nvGraphicFramePr>
               <p:cNvPr id="4" name="Tabella 2">
@@ -11232,13 +11351,13 @@
               <p:nvPr>
                 <p:extLst>
                   <p:ext uri="{D42A27DB-BD31-4B8C-83A1-F6EECF244321}">
-                    <p14:modId xmlns:p14="http://schemas.microsoft.com/office/powerpoint/2010/main" val="3655751562"/>
+                    <p14:modId xmlns:p14="http://schemas.microsoft.com/office/powerpoint/2010/main" val="3003672838"/>
                   </p:ext>
                 </p:extLst>
               </p:nvPr>
             </p:nvGraphicFramePr>
             <p:xfrm>
-              <a:off x="6096000" y="822039"/>
+              <a:off x="6235344" y="1440225"/>
               <a:ext cx="5191697" cy="3931920"/>
             </p:xfrm>
             <a:graphic>
@@ -11849,7 +11968,7 @@
             </a:graphic>
           </p:graphicFrame>
         </mc:Choice>
-        <mc:Fallback xmlns="">
+        <mc:Fallback>
           <p:graphicFrame>
             <p:nvGraphicFramePr>
               <p:cNvPr id="4" name="Tabella 2">
@@ -11865,13 +11984,13 @@
               <p:nvPr>
                 <p:extLst>
                   <p:ext uri="{D42A27DB-BD31-4B8C-83A1-F6EECF244321}">
-                    <p14:modId xmlns:p14="http://schemas.microsoft.com/office/powerpoint/2010/main" val="3655751562"/>
+                    <p14:modId xmlns:p14="http://schemas.microsoft.com/office/powerpoint/2010/main" val="3003672838"/>
                   </p:ext>
                 </p:extLst>
               </p:nvPr>
             </p:nvGraphicFramePr>
             <p:xfrm>
-              <a:off x="6096000" y="822039"/>
+              <a:off x="6235344" y="1440225"/>
               <a:ext cx="5191697" cy="3931920"/>
             </p:xfrm>
             <a:graphic>
@@ -12002,7 +12121,7 @@
                         <a:blipFill>
                           <a:blip r:embed="rId3"/>
                           <a:stretch>
-                            <a:fillRect l="-83656" t="-283333" r="-860" b="-728333"/>
+                            <a:fillRect l="-83656" t="-283333" r="-860" b="-726667"/>
                           </a:stretch>
                         </a:blipFill>
                       </a:tcPr>
@@ -12051,7 +12170,7 @@
                         <a:blipFill>
                           <a:blip r:embed="rId3"/>
                           <a:stretch>
-                            <a:fillRect l="-83656" t="-383333" r="-860" b="-628333"/>
+                            <a:fillRect l="-83656" t="-383333" r="-860" b="-626667"/>
                           </a:stretch>
                         </a:blipFill>
                       </a:tcPr>
@@ -12358,7 +12477,7 @@
                         <a:blipFill>
                           <a:blip r:embed="rId3"/>
                           <a:stretch>
-                            <a:fillRect l="-83656" t="-985000" r="-860" b="-26667"/>
+                            <a:fillRect l="-83656" t="-985000" r="-860" b="-25000"/>
                           </a:stretch>
                         </a:blipFill>
                       </a:tcPr>
@@ -12375,6 +12494,91 @@
           </p:graphicFrame>
         </mc:Fallback>
       </mc:AlternateContent>
+      <p:sp>
+        <p:nvSpPr>
+          <p:cNvPr id="3" name="CasellaDiTesto 2">
+            <a:extLst>
+              <a:ext uri="{FF2B5EF4-FFF2-40B4-BE49-F238E27FC236}">
+                <a16:creationId xmlns:a16="http://schemas.microsoft.com/office/drawing/2014/main" id="{D35E51B5-772F-483E-A014-C73AFD16BEE7}"/>
+              </a:ext>
+            </a:extLst>
+          </p:cNvPr>
+          <p:cNvSpPr txBox="1"/>
+          <p:nvPr/>
+        </p:nvSpPr>
+        <p:spPr>
+          <a:xfrm>
+            <a:off x="34344" y="203853"/>
+            <a:ext cx="12192000" cy="954107"/>
+          </a:xfrm>
+          <a:prstGeom prst="rect">
+            <a:avLst/>
+          </a:prstGeom>
+          <a:noFill/>
+        </p:spPr>
+        <p:txBody>
+          <a:bodyPr wrap="square" rtlCol="0">
+            <a:spAutoFit/>
+          </a:bodyPr>
+          <a:lstStyle/>
+          <a:p>
+            <a:pPr algn="ctr"/>
+            <a:r>
+              <a:rPr lang="it-IT" sz="2800" dirty="0"/>
+              <a:t>Source: B. </a:t>
+            </a:r>
+            <a:r>
+              <a:rPr lang="it-IT" sz="2800" dirty="0" err="1"/>
+              <a:t>Radisavljevic</a:t>
+            </a:r>
+            <a:r>
+              <a:rPr lang="it-IT" sz="2800" dirty="0"/>
+              <a:t>, A. </a:t>
+            </a:r>
+            <a:r>
+              <a:rPr lang="it-IT" sz="2800" dirty="0" err="1"/>
+              <a:t>Radenovic</a:t>
+            </a:r>
+            <a:r>
+              <a:rPr lang="it-IT" sz="2800" dirty="0"/>
+              <a:t>, J. Brivio, V. Giacometti and A. </a:t>
+            </a:r>
+            <a:r>
+              <a:rPr lang="it-IT" sz="2800" dirty="0" err="1"/>
+              <a:t>Kis</a:t>
+            </a:r>
+            <a:r>
+              <a:rPr lang="it-IT" sz="2800" dirty="0"/>
+              <a:t>, </a:t>
+            </a:r>
+            <a:r>
+              <a:rPr lang="en-US" sz="2800" b="1" dirty="0"/>
+              <a:t>“</a:t>
+            </a:r>
+            <a:r>
+              <a:rPr lang="it-IT" sz="2800" b="1" dirty="0"/>
+              <a:t>Single-</a:t>
+            </a:r>
+            <a:r>
+              <a:rPr lang="it-IT" sz="2800" b="1" dirty="0" err="1"/>
+              <a:t>layer</a:t>
+            </a:r>
+            <a:r>
+              <a:rPr lang="it-IT" sz="2800" b="1" dirty="0"/>
+              <a:t> MoS2 </a:t>
+            </a:r>
+            <a:r>
+              <a:rPr lang="it-IT" sz="2800" b="1" dirty="0" err="1"/>
+              <a:t>transistors</a:t>
+            </a:r>
+            <a:r>
+              <a:rPr lang="en-US" sz="2800" b="1" dirty="0"/>
+              <a:t>”</a:t>
+            </a:r>
+            <a:endParaRPr lang="it-IT" sz="2800" b="1" dirty="0"/>
+          </a:p>
+        </p:txBody>
+      </p:sp>
     </p:spTree>
     <p:extLst>
       <p:ext uri="{BB962C8B-B14F-4D97-AF65-F5344CB8AC3E}">
@@ -12405,8 +12609,8 @@
           <a:chExt cx="0" cy="0"/>
         </a:xfrm>
       </p:grpSpPr>
-      <mc:AlternateContent xmlns:mc="http://schemas.openxmlformats.org/markup-compatibility/2006">
-        <mc:Choice xmlns:a14="http://schemas.microsoft.com/office/drawing/2010/main" Requires="a14">
+      <mc:AlternateContent xmlns:mc="http://schemas.openxmlformats.org/markup-compatibility/2006" xmlns:a14="http://schemas.microsoft.com/office/drawing/2010/main">
+        <mc:Choice Requires="a14">
           <p:sp>
             <p:nvSpPr>
               <p:cNvPr id="5" name="CasellaDiTesto 4">
@@ -12585,7 +12789,7 @@
             </p:txBody>
           </p:sp>
         </mc:Choice>
-        <mc:Fallback>
+        <mc:Fallback xmlns="">
           <p:sp>
             <p:nvSpPr>
               <p:cNvPr id="5" name="CasellaDiTesto 4">
@@ -12632,10 +12836,10 @@
       </mc:AlternateContent>
       <p:pic>
         <p:nvPicPr>
-          <p:cNvPr id="11" name="Immagine 10" descr="Immagine che contiene mappa, testo&#10;&#10;Descrizione generata automaticamente">
+          <p:cNvPr id="6" name="Immagine 5" descr="Immagine che contiene mappa&#10;&#10;Descrizione generata automaticamente">
             <a:extLst>
               <a:ext uri="{FF2B5EF4-FFF2-40B4-BE49-F238E27FC236}">
-                <a16:creationId xmlns:a16="http://schemas.microsoft.com/office/drawing/2014/main" id="{67C1D872-6A59-4706-9862-09852B536016}"/>
+                <a16:creationId xmlns:a16="http://schemas.microsoft.com/office/drawing/2014/main" id="{E3161DE1-31C7-4200-872C-B6D1E6A811AB}"/>
               </a:ext>
             </a:extLst>
           </p:cNvPr>
@@ -12658,8 +12862,8 @@
         </p:blipFill>
         <p:spPr>
           <a:xfrm>
-            <a:off x="2399061" y="1314705"/>
-            <a:ext cx="7393877" cy="5543295"/>
+            <a:off x="2289572" y="1150536"/>
+            <a:ext cx="7612853" cy="5707464"/>
           </a:xfrm>
           <a:prstGeom prst="rect">
             <a:avLst/>

</xml_diff>

<commit_message>
update plot and presentazione 2
</commit_message>
<xml_diff>
--- a/Presentazione COMSOL - 2.pptx
+++ b/Presentazione COMSOL - 2.pptx
@@ -3991,10 +3991,10 @@
       </mc:AlternateContent>
       <p:pic>
         <p:nvPicPr>
-          <p:cNvPr id="5" name="Immagine 4" descr="Immagine che contiene mappa, testo&#10;&#10;Descrizione generata automaticamente">
+          <p:cNvPr id="6" name="Immagine 5" descr="Immagine che contiene mappa, testo&#10;&#10;Descrizione generata automaticamente">
             <a:extLst>
               <a:ext uri="{FF2B5EF4-FFF2-40B4-BE49-F238E27FC236}">
-                <a16:creationId xmlns:a16="http://schemas.microsoft.com/office/drawing/2014/main" id="{4673F32C-0C28-4D3A-9711-E39E657E67F2}"/>
+                <a16:creationId xmlns:a16="http://schemas.microsoft.com/office/drawing/2014/main" id="{50CBD06E-07C9-41D3-8762-A0F62F29D3CB}"/>
               </a:ext>
             </a:extLst>
           </p:cNvPr>
@@ -4017,8 +4017,8 @@
         </p:blipFill>
         <p:spPr>
           <a:xfrm>
-            <a:off x="2401260" y="1318003"/>
-            <a:ext cx="7389479" cy="5539997"/>
+            <a:off x="2279075" y="1242324"/>
+            <a:ext cx="7490422" cy="5615676"/>
           </a:xfrm>
           <a:prstGeom prst="rect">
             <a:avLst/>
@@ -4631,8 +4631,8 @@
           <a:chExt cx="0" cy="0"/>
         </a:xfrm>
       </p:grpSpPr>
-      <mc:AlternateContent xmlns:mc="http://schemas.openxmlformats.org/markup-compatibility/2006">
-        <mc:Choice xmlns:a14="http://schemas.microsoft.com/office/drawing/2010/main" Requires="a14">
+      <mc:AlternateContent xmlns:mc="http://schemas.openxmlformats.org/markup-compatibility/2006" xmlns:a14="http://schemas.microsoft.com/office/drawing/2010/main">
+        <mc:Choice Requires="a14">
           <p:graphicFrame>
             <p:nvGraphicFramePr>
               <p:cNvPr id="2" name="Tabella 2">
@@ -5726,7 +5726,7 @@
             </a:graphic>
           </p:graphicFrame>
         </mc:Choice>
-        <mc:Fallback>
+        <mc:Fallback xmlns="">
           <p:graphicFrame>
             <p:nvGraphicFramePr>
               <p:cNvPr id="2" name="Tabella 2">
@@ -6715,8 +6715,8 @@
           </p:graphicFrame>
         </mc:Fallback>
       </mc:AlternateContent>
-      <mc:AlternateContent xmlns:mc="http://schemas.openxmlformats.org/markup-compatibility/2006">
-        <mc:Choice xmlns:a14="http://schemas.microsoft.com/office/drawing/2010/main" Requires="a14">
+      <mc:AlternateContent xmlns:mc="http://schemas.openxmlformats.org/markup-compatibility/2006" xmlns:a14="http://schemas.microsoft.com/office/drawing/2010/main">
+        <mc:Choice Requires="a14">
           <p:graphicFrame>
             <p:nvGraphicFramePr>
               <p:cNvPr id="4" name="Tabella 2">
@@ -7555,7 +7555,7 @@
             </a:graphic>
           </p:graphicFrame>
         </mc:Choice>
-        <mc:Fallback>
+        <mc:Fallback xmlns="">
           <p:graphicFrame>
             <p:nvGraphicFramePr>
               <p:cNvPr id="4" name="Tabella 2">
@@ -8507,10 +8507,10 @@
       </mc:AlternateContent>
       <p:pic>
         <p:nvPicPr>
-          <p:cNvPr id="3" name="Immagine 2" descr="Immagine che contiene mappa, testo&#10;&#10;Descrizione generata automaticamente">
+          <p:cNvPr id="9" name="Immagine 8" descr="Immagine che contiene mappa, testo&#10;&#10;Descrizione generata automaticamente">
             <a:extLst>
               <a:ext uri="{FF2B5EF4-FFF2-40B4-BE49-F238E27FC236}">
-                <a16:creationId xmlns:a16="http://schemas.microsoft.com/office/drawing/2014/main" id="{DDD2225C-28D4-4AA2-9417-6EDAC1551DFB}"/>
+                <a16:creationId xmlns:a16="http://schemas.microsoft.com/office/drawing/2014/main" id="{44BB2560-4DA3-4B4E-8D60-8791087E88EE}"/>
               </a:ext>
             </a:extLst>
           </p:cNvPr>
@@ -8533,8 +8533,8 @@
         </p:blipFill>
         <p:spPr>
           <a:xfrm>
-            <a:off x="1998998" y="714839"/>
-            <a:ext cx="8194004" cy="6143161"/>
+            <a:off x="2033521" y="766604"/>
+            <a:ext cx="8124957" cy="6091396"/>
           </a:xfrm>
           <a:prstGeom prst="rect">
             <a:avLst/>
@@ -8709,10 +8709,10 @@
       </mc:AlternateContent>
       <p:pic>
         <p:nvPicPr>
-          <p:cNvPr id="6" name="Immagine 5" descr="Immagine che contiene mappa&#10;&#10;Descrizione generata automaticamente">
+          <p:cNvPr id="3" name="Immagine 2" descr="Immagine che contiene mappa&#10;&#10;Descrizione generata automaticamente">
             <a:extLst>
               <a:ext uri="{FF2B5EF4-FFF2-40B4-BE49-F238E27FC236}">
-                <a16:creationId xmlns:a16="http://schemas.microsoft.com/office/drawing/2014/main" id="{BA5347E9-0D05-418A-BA85-D88C5E21814B}"/>
+                <a16:creationId xmlns:a16="http://schemas.microsoft.com/office/drawing/2014/main" id="{EC248022-4646-428A-83E2-D023B6E3A9A4}"/>
               </a:ext>
             </a:extLst>
           </p:cNvPr>
@@ -8735,8 +8735,8 @@
         </p:blipFill>
         <p:spPr>
           <a:xfrm>
-            <a:off x="2055455" y="799493"/>
-            <a:ext cx="8081089" cy="6058507"/>
+            <a:off x="2085932" y="845191"/>
+            <a:ext cx="8020135" cy="6012809"/>
           </a:xfrm>
           <a:prstGeom prst="rect">
             <a:avLst/>
@@ -8917,10 +8917,10 @@
       </mc:AlternateContent>
       <p:pic>
         <p:nvPicPr>
-          <p:cNvPr id="8" name="Immagine 7" descr="Immagine che contiene testo, mappa, aria, gruppo&#10;&#10;Descrizione generata automaticamente">
+          <p:cNvPr id="5" name="Immagine 4" descr="Immagine che contiene testo, mappa, tavolo, computer&#10;&#10;Descrizione generata automaticamente">
             <a:extLst>
               <a:ext uri="{FF2B5EF4-FFF2-40B4-BE49-F238E27FC236}">
-                <a16:creationId xmlns:a16="http://schemas.microsoft.com/office/drawing/2014/main" id="{0F17C5A4-732B-49E6-BEA2-A07E35AE16D0}"/>
+                <a16:creationId xmlns:a16="http://schemas.microsoft.com/office/drawing/2014/main" id="{1C1F7497-6D50-42F5-8F1D-8814FBF08243}"/>
               </a:ext>
             </a:extLst>
           </p:cNvPr>
@@ -8943,8 +8943,8 @@
         </p:blipFill>
         <p:spPr>
           <a:xfrm>
-            <a:off x="1672145" y="833057"/>
-            <a:ext cx="8652098" cy="6024943"/>
+            <a:off x="137626" y="833057"/>
+            <a:ext cx="11916745" cy="6028163"/>
           </a:xfrm>
           <a:prstGeom prst="rect">
             <a:avLst/>
@@ -9113,10 +9113,10 @@
       </mc:AlternateContent>
       <p:pic>
         <p:nvPicPr>
-          <p:cNvPr id="12" name="Immagine 11" descr="Immagine che contiene mappa&#10;&#10;Descrizione generata automaticamente">
+          <p:cNvPr id="3" name="Immagine 2" descr="Immagine che contiene testo, mappa&#10;&#10;Descrizione generata automaticamente">
             <a:extLst>
               <a:ext uri="{FF2B5EF4-FFF2-40B4-BE49-F238E27FC236}">
-                <a16:creationId xmlns:a16="http://schemas.microsoft.com/office/drawing/2014/main" id="{8FC8CC78-F0F6-4B58-AD5C-F6F472106E7E}"/>
+                <a16:creationId xmlns:a16="http://schemas.microsoft.com/office/drawing/2014/main" id="{FFD58EB4-074C-4DB6-8383-ED227C6BB19C}"/>
               </a:ext>
             </a:extLst>
           </p:cNvPr>
@@ -9421,8 +9421,8 @@
           <a:chExt cx="0" cy="0"/>
         </a:xfrm>
       </p:grpSpPr>
-      <mc:AlternateContent xmlns:mc="http://schemas.openxmlformats.org/markup-compatibility/2006">
-        <mc:Choice xmlns:a14="http://schemas.microsoft.com/office/drawing/2010/main" Requires="a14">
+      <mc:AlternateContent xmlns:mc="http://schemas.openxmlformats.org/markup-compatibility/2006" xmlns:a14="http://schemas.microsoft.com/office/drawing/2010/main">
+        <mc:Choice Requires="a14">
           <p:graphicFrame>
             <p:nvGraphicFramePr>
               <p:cNvPr id="2" name="Tabella 2">
@@ -10404,7 +10404,7 @@
             </a:graphic>
           </p:graphicFrame>
         </mc:Choice>
-        <mc:Fallback>
+        <mc:Fallback xmlns="">
           <p:graphicFrame>
             <p:nvGraphicFramePr>
               <p:cNvPr id="2" name="Tabella 2">
@@ -11334,8 +11334,8 @@
           </p:graphicFrame>
         </mc:Fallback>
       </mc:AlternateContent>
-      <mc:AlternateContent xmlns:mc="http://schemas.openxmlformats.org/markup-compatibility/2006">
-        <mc:Choice xmlns:a14="http://schemas.microsoft.com/office/drawing/2010/main" Requires="a14">
+      <mc:AlternateContent xmlns:mc="http://schemas.openxmlformats.org/markup-compatibility/2006" xmlns:a14="http://schemas.microsoft.com/office/drawing/2010/main">
+        <mc:Choice Requires="a14">
           <p:graphicFrame>
             <p:nvGraphicFramePr>
               <p:cNvPr id="4" name="Tabella 2">
@@ -11968,7 +11968,7 @@
             </a:graphic>
           </p:graphicFrame>
         </mc:Choice>
-        <mc:Fallback>
+        <mc:Fallback xmlns="">
           <p:graphicFrame>
             <p:nvGraphicFramePr>
               <p:cNvPr id="4" name="Tabella 2">

</xml_diff>